<commit_message>
Rename figure files to add eval_method files
</commit_message>
<xml_diff>
--- a/figure/eval_method.pptx
+++ b/figure/eval_method.pptx
@@ -304,7 +304,7 @@
           <a:p>
             <a:fld id="{E90ED720-0104-4369-84BC-D37694168613}" type="datetimeFigureOut">
               <a:rPr kumimoji="1" lang="ja-JP" altLang="en-US" smtClean="0"/>
-              <a:t>2016/3/26</a:t>
+              <a:t>2016/2/13</a:t>
             </a:fld>
             <a:endParaRPr kumimoji="1" lang="ja-JP" altLang="en-US"/>
           </a:p>
@@ -501,7 +501,7 @@
           <a:p>
             <a:fld id="{E90ED720-0104-4369-84BC-D37694168613}" type="datetimeFigureOut">
               <a:rPr kumimoji="1" lang="ja-JP" altLang="en-US" smtClean="0"/>
-              <a:t>2016/3/26</a:t>
+              <a:t>2016/2/13</a:t>
             </a:fld>
             <a:endParaRPr kumimoji="1" lang="ja-JP" altLang="en-US"/>
           </a:p>
@@ -708,7 +708,7 @@
           <a:p>
             <a:fld id="{E90ED720-0104-4369-84BC-D37694168613}" type="datetimeFigureOut">
               <a:rPr kumimoji="1" lang="ja-JP" altLang="en-US" smtClean="0"/>
-              <a:t>2016/3/26</a:t>
+              <a:t>2016/2/13</a:t>
             </a:fld>
             <a:endParaRPr kumimoji="1" lang="ja-JP" altLang="en-US"/>
           </a:p>
@@ -905,7 +905,7 @@
           <a:p>
             <a:fld id="{E90ED720-0104-4369-84BC-D37694168613}" type="datetimeFigureOut">
               <a:rPr kumimoji="1" lang="ja-JP" altLang="en-US" smtClean="0"/>
-              <a:t>2016/3/26</a:t>
+              <a:t>2016/2/13</a:t>
             </a:fld>
             <a:endParaRPr kumimoji="1" lang="ja-JP" altLang="en-US"/>
           </a:p>
@@ -1146,7 +1146,7 @@
           <a:p>
             <a:fld id="{E90ED720-0104-4369-84BC-D37694168613}" type="datetimeFigureOut">
               <a:rPr kumimoji="1" lang="ja-JP" altLang="en-US" smtClean="0"/>
-              <a:t>2016/3/26</a:t>
+              <a:t>2016/2/13</a:t>
             </a:fld>
             <a:endParaRPr kumimoji="1" lang="ja-JP" altLang="en-US"/>
           </a:p>
@@ -1493,7 +1493,7 @@
           <a:p>
             <a:fld id="{E90ED720-0104-4369-84BC-D37694168613}" type="datetimeFigureOut">
               <a:rPr kumimoji="1" lang="ja-JP" altLang="en-US" smtClean="0"/>
-              <a:t>2016/3/26</a:t>
+              <a:t>2016/2/13</a:t>
             </a:fld>
             <a:endParaRPr kumimoji="1" lang="ja-JP" altLang="en-US"/>
           </a:p>
@@ -1974,7 +1974,7 @@
           <a:p>
             <a:fld id="{E90ED720-0104-4369-84BC-D37694168613}" type="datetimeFigureOut">
               <a:rPr kumimoji="1" lang="ja-JP" altLang="en-US" smtClean="0"/>
-              <a:t>2016/3/26</a:t>
+              <a:t>2016/2/13</a:t>
             </a:fld>
             <a:endParaRPr kumimoji="1" lang="ja-JP" altLang="en-US"/>
           </a:p>
@@ -2087,7 +2087,7 @@
           <a:p>
             <a:fld id="{E90ED720-0104-4369-84BC-D37694168613}" type="datetimeFigureOut">
               <a:rPr kumimoji="1" lang="ja-JP" altLang="en-US" smtClean="0"/>
-              <a:t>2016/3/26</a:t>
+              <a:t>2016/2/13</a:t>
             </a:fld>
             <a:endParaRPr kumimoji="1" lang="ja-JP" altLang="en-US"/>
           </a:p>
@@ -2177,7 +2177,7 @@
           <a:p>
             <a:fld id="{E90ED720-0104-4369-84BC-D37694168613}" type="datetimeFigureOut">
               <a:rPr kumimoji="1" lang="ja-JP" altLang="en-US" smtClean="0"/>
-              <a:t>2016/3/26</a:t>
+              <a:t>2016/2/13</a:t>
             </a:fld>
             <a:endParaRPr kumimoji="1" lang="ja-JP" altLang="en-US"/>
           </a:p>
@@ -2481,7 +2481,7 @@
           <a:p>
             <a:fld id="{E90ED720-0104-4369-84BC-D37694168613}" type="datetimeFigureOut">
               <a:rPr kumimoji="1" lang="ja-JP" altLang="en-US" smtClean="0"/>
-              <a:t>2016/3/26</a:t>
+              <a:t>2016/2/13</a:t>
             </a:fld>
             <a:endParaRPr kumimoji="1" lang="ja-JP" altLang="en-US"/>
           </a:p>
@@ -2729,7 +2729,7 @@
           <a:p>
             <a:fld id="{E90ED720-0104-4369-84BC-D37694168613}" type="datetimeFigureOut">
               <a:rPr kumimoji="1" lang="ja-JP" altLang="en-US" smtClean="0"/>
-              <a:t>2016/3/26</a:t>
+              <a:t>2016/2/13</a:t>
             </a:fld>
             <a:endParaRPr kumimoji="1" lang="ja-JP" altLang="en-US"/>
           </a:p>
@@ -2969,7 +2969,7 @@
           <a:p>
             <a:fld id="{E90ED720-0104-4369-84BC-D37694168613}" type="datetimeFigureOut">
               <a:rPr kumimoji="1" lang="ja-JP" altLang="en-US" smtClean="0"/>
-              <a:t>2016/3/26</a:t>
+              <a:t>2016/2/13</a:t>
             </a:fld>
             <a:endParaRPr kumimoji="1" lang="ja-JP" altLang="en-US"/>
           </a:p>
@@ -3488,7 +3488,7 @@
                 <a:latin typeface="Meiryo UI" panose="020B0604030504040204" pitchFamily="50" charset="-128"/>
                 <a:ea typeface="Meiryo UI" panose="020B0604030504040204" pitchFamily="50" charset="-128"/>
               </a:rPr>
-              <a:t>talker</a:t>
+              <a:t>client</a:t>
             </a:r>
             <a:endParaRPr kumimoji="0" lang="en-US" altLang="ja-JP" sz="1201" kern="0" dirty="0">
               <a:solidFill>
@@ -3930,7 +3930,7 @@
                 <a:latin typeface="Meiryo UI" panose="020B0604030504040204" pitchFamily="50" charset="-128"/>
                 <a:ea typeface="Meiryo UI" panose="020B0604030504040204" pitchFamily="50" charset="-128"/>
               </a:rPr>
-              <a:t>listener</a:t>
+              <a:t>server</a:t>
             </a:r>
             <a:endParaRPr kumimoji="0" lang="en-US" altLang="ja-JP" sz="1201" kern="0" dirty="0">
               <a:solidFill>
@@ -3974,13 +3974,103 @@
       </p:cxnSp>
       <p:sp>
         <p:nvSpPr>
+          <p:cNvPr id="75" name="フリーフォーム 74"/>
+          <p:cNvSpPr/>
+          <p:nvPr/>
+        </p:nvSpPr>
+        <p:spPr>
+          <a:xfrm flipH="1">
+            <a:off x="902716" y="2137121"/>
+            <a:ext cx="5090966" cy="785500"/>
+          </a:xfrm>
+          <a:custGeom>
+            <a:avLst/>
+            <a:gdLst>
+              <a:gd name="connsiteX0" fmla="*/ 0 w 5029200"/>
+              <a:gd name="connsiteY0" fmla="*/ 0 h 914400"/>
+              <a:gd name="connsiteX1" fmla="*/ 0 w 5029200"/>
+              <a:gd name="connsiteY1" fmla="*/ 914400 h 914400"/>
+              <a:gd name="connsiteX2" fmla="*/ 5029200 w 5029200"/>
+              <a:gd name="connsiteY2" fmla="*/ 914400 h 914400"/>
+              <a:gd name="connsiteX3" fmla="*/ 5029200 w 5029200"/>
+              <a:gd name="connsiteY3" fmla="*/ 10160 h 914400"/>
+            </a:gdLst>
+            <a:ahLst/>
+            <a:cxnLst>
+              <a:cxn ang="0">
+                <a:pos x="connsiteX0" y="connsiteY0"/>
+              </a:cxn>
+              <a:cxn ang="0">
+                <a:pos x="connsiteX1" y="connsiteY1"/>
+              </a:cxn>
+              <a:cxn ang="0">
+                <a:pos x="connsiteX2" y="connsiteY2"/>
+              </a:cxn>
+              <a:cxn ang="0">
+                <a:pos x="connsiteX3" y="connsiteY3"/>
+              </a:cxn>
+            </a:cxnLst>
+            <a:rect l="l" t="t" r="r" b="b"/>
+            <a:pathLst>
+              <a:path w="5029200" h="914400">
+                <a:moveTo>
+                  <a:pt x="0" y="0"/>
+                </a:moveTo>
+                <a:lnTo>
+                  <a:pt x="0" y="914400"/>
+                </a:lnTo>
+                <a:lnTo>
+                  <a:pt x="5029200" y="914400"/>
+                </a:lnTo>
+                <a:lnTo>
+                  <a:pt x="5029200" y="10160"/>
+                </a:lnTo>
+              </a:path>
+            </a:pathLst>
+          </a:custGeom>
+          <a:noFill/>
+          <a:ln w="60325" cmpd="dbl">
+            <a:solidFill>
+              <a:schemeClr val="tx1"/>
+            </a:solidFill>
+            <a:headEnd type="none"/>
+            <a:tailEnd type="triangle" w="sm" len="med"/>
+          </a:ln>
+        </p:spPr>
+        <p:style>
+          <a:lnRef idx="2">
+            <a:schemeClr val="accent1">
+              <a:shade val="50000"/>
+            </a:schemeClr>
+          </a:lnRef>
+          <a:fillRef idx="1">
+            <a:schemeClr val="accent1"/>
+          </a:fillRef>
+          <a:effectRef idx="0">
+            <a:schemeClr val="accent1"/>
+          </a:effectRef>
+          <a:fontRef idx="minor">
+            <a:schemeClr val="lt1"/>
+          </a:fontRef>
+        </p:style>
+        <p:txBody>
+          <a:bodyPr rtlCol="0" anchor="ctr"/>
+          <a:lstStyle/>
+          <a:p>
+            <a:pPr algn="ctr"/>
+            <a:endParaRPr kumimoji="1" lang="ja-JP" altLang="en-US"/>
+          </a:p>
+        </p:txBody>
+      </p:sp>
+      <p:sp>
+        <p:nvSpPr>
           <p:cNvPr id="76" name="円/楕円 75"/>
           <p:cNvSpPr/>
           <p:nvPr/>
         </p:nvSpPr>
         <p:spPr>
           <a:xfrm>
-            <a:off x="3239963" y="105170"/>
+            <a:off x="1425800" y="24086"/>
             <a:ext cx="949472" cy="559697"/>
           </a:xfrm>
           <a:prstGeom prst="ellipse">
@@ -4026,7 +4116,7 @@
         </p:nvSpPr>
         <p:spPr>
           <a:xfrm>
-            <a:off x="4450954" y="158627"/>
+            <a:off x="2636791" y="77543"/>
             <a:ext cx="748997" cy="452776"/>
           </a:xfrm>
           <a:prstGeom prst="rect">
@@ -4102,7 +4192,7 @@
         </p:nvCxnSpPr>
         <p:spPr>
           <a:xfrm>
-            <a:off x="5461468" y="557103"/>
+            <a:off x="3647305" y="476019"/>
             <a:ext cx="1237573" cy="55"/>
           </a:xfrm>
           <a:prstGeom prst="straightConnector1">
@@ -4129,7 +4219,7 @@
         </p:nvSpPr>
         <p:spPr>
           <a:xfrm>
-            <a:off x="5365159" y="186439"/>
+            <a:off x="3550996" y="105355"/>
             <a:ext cx="1399742" cy="261610"/>
           </a:xfrm>
           <a:prstGeom prst="rect">
@@ -4152,6 +4242,72 @@
                 <a:ea typeface="Meiryo UI" panose="020B0604030504040204" pitchFamily="50" charset="-128"/>
               </a:rPr>
               <a:t>Publish/Subscribe</a:t>
+            </a:r>
+            <a:endParaRPr lang="ja-JP" altLang="en-US" sz="1100" dirty="0">
+              <a:latin typeface="Meiryo UI" panose="020B0604030504040204" pitchFamily="50" charset="-128"/>
+              <a:ea typeface="Meiryo UI" panose="020B0604030504040204" pitchFamily="50" charset="-128"/>
+            </a:endParaRPr>
+          </a:p>
+        </p:txBody>
+      </p:sp>
+      <p:cxnSp>
+        <p:nvCxnSpPr>
+          <p:cNvPr id="80" name="直線矢印コネクタ 79"/>
+          <p:cNvCxnSpPr/>
+          <p:nvPr/>
+        </p:nvCxnSpPr>
+        <p:spPr>
+          <a:xfrm>
+            <a:off x="5200019" y="476019"/>
+            <a:ext cx="1512438" cy="55"/>
+          </a:xfrm>
+          <a:prstGeom prst="straightConnector1">
+            <a:avLst/>
+          </a:prstGeom>
+          <a:noFill/>
+          <a:ln w="38100" cap="flat" cmpd="dbl" algn="ctr">
+            <a:solidFill>
+              <a:schemeClr val="tx1"/>
+            </a:solidFill>
+            <a:prstDash val="solid"/>
+            <a:miter lim="800000"/>
+            <a:headEnd w="lg" len="lg"/>
+            <a:tailEnd type="triangle" w="med" len="med"/>
+          </a:ln>
+          <a:effectLst/>
+        </p:spPr>
+      </p:cxnSp>
+      <p:sp>
+        <p:nvSpPr>
+          <p:cNvPr id="81" name="テキスト ボックス 80"/>
+          <p:cNvSpPr txBox="1"/>
+          <p:nvPr/>
+        </p:nvSpPr>
+        <p:spPr>
+          <a:xfrm>
+            <a:off x="5076835" y="90716"/>
+            <a:ext cx="1758815" cy="261610"/>
+          </a:xfrm>
+          <a:prstGeom prst="rect">
+            <a:avLst/>
+          </a:prstGeom>
+          <a:noFill/>
+        </p:spPr>
+        <p:txBody>
+          <a:bodyPr wrap="none">
+            <a:spAutoFit/>
+          </a:bodyPr>
+          <a:lstStyle/>
+          <a:p>
+            <a:pPr algn="ctr">
+              <a:defRPr/>
+            </a:pPr>
+            <a:r>
+              <a:rPr lang="en-US" altLang="ja-JP" sz="1100" dirty="0" smtClean="0">
+                <a:latin typeface="Meiryo UI" panose="020B0604030504040204" pitchFamily="50" charset="-128"/>
+                <a:ea typeface="Meiryo UI" panose="020B0604030504040204" pitchFamily="50" charset="-128"/>
+              </a:rPr>
+              <a:t>Socket Communication</a:t>
             </a:r>
             <a:endParaRPr lang="ja-JP" altLang="en-US" sz="1100" dirty="0">
               <a:latin typeface="Meiryo UI" panose="020B0604030504040204" pitchFamily="50" charset="-128"/>

</xml_diff>